<commit_message>
Revisão para versão final
</commit_message>
<xml_diff>
--- a/Apresentação A3_rev2.pptx
+++ b/Apresentação A3_rev2.pptx
@@ -119,6 +119,80 @@
 </p:presentation>
 </file>
 
+<file path=ppt/changesInfos/changesInfo1.xml><?xml version="1.0" encoding="utf-8"?>
+<pc:chgInfo xmlns:a="http://schemas.openxmlformats.org/drawingml/2006/main" xmlns:r="http://schemas.openxmlformats.org/officeDocument/2006/relationships" xmlns:ac="http://schemas.microsoft.com/office/drawing/2013/main/command" xmlns:pc="http://schemas.microsoft.com/office/powerpoint/2013/main/command">
+  <pc:docChgLst>
+    <pc:chgData name="helio arai" userId="00509125f3a67541" providerId="LiveId" clId="{D9A7AF5A-9B85-424F-8A4D-C58E349D2138}"/>
+    <pc:docChg chg="custSel modSld">
+      <pc:chgData name="helio arai" userId="00509125f3a67541" providerId="LiveId" clId="{D9A7AF5A-9B85-424F-8A4D-C58E349D2138}" dt="2022-11-28T23:18:12.999" v="119" actId="20577"/>
+      <pc:docMkLst>
+        <pc:docMk/>
+      </pc:docMkLst>
+      <pc:sldChg chg="modSp mod">
+        <pc:chgData name="helio arai" userId="00509125f3a67541" providerId="LiveId" clId="{D9A7AF5A-9B85-424F-8A4D-C58E349D2138}" dt="2022-11-24T07:38:08.218" v="11" actId="20577"/>
+        <pc:sldMkLst>
+          <pc:docMk/>
+          <pc:sldMk cId="2788577900" sldId="258"/>
+        </pc:sldMkLst>
+        <pc:spChg chg="mod">
+          <ac:chgData name="helio arai" userId="00509125f3a67541" providerId="LiveId" clId="{D9A7AF5A-9B85-424F-8A4D-C58E349D2138}" dt="2022-11-24T07:38:08.218" v="11" actId="20577"/>
+          <ac:spMkLst>
+            <pc:docMk/>
+            <pc:sldMk cId="2788577900" sldId="258"/>
+            <ac:spMk id="3" creationId="{F20BFBE6-B8D7-4314-965B-606B8E655C9D}"/>
+          </ac:spMkLst>
+        </pc:spChg>
+      </pc:sldChg>
+      <pc:sldChg chg="modSp mod">
+        <pc:chgData name="helio arai" userId="00509125f3a67541" providerId="LiveId" clId="{D9A7AF5A-9B85-424F-8A4D-C58E349D2138}" dt="2022-11-24T07:42:47.820" v="117" actId="20577"/>
+        <pc:sldMkLst>
+          <pc:docMk/>
+          <pc:sldMk cId="2707497116" sldId="261"/>
+        </pc:sldMkLst>
+        <pc:spChg chg="mod">
+          <ac:chgData name="helio arai" userId="00509125f3a67541" providerId="LiveId" clId="{D9A7AF5A-9B85-424F-8A4D-C58E349D2138}" dt="2022-11-24T07:42:47.820" v="117" actId="20577"/>
+          <ac:spMkLst>
+            <pc:docMk/>
+            <pc:sldMk cId="2707497116" sldId="261"/>
+            <ac:spMk id="6" creationId="{381FC242-47C1-2351-11D7-84AFD80EDE6A}"/>
+          </ac:spMkLst>
+        </pc:spChg>
+      </pc:sldChg>
+      <pc:sldChg chg="modSp mod">
+        <pc:chgData name="helio arai" userId="00509125f3a67541" providerId="LiveId" clId="{D9A7AF5A-9B85-424F-8A4D-C58E349D2138}" dt="2022-11-24T07:38:32.548" v="27" actId="20577"/>
+        <pc:sldMkLst>
+          <pc:docMk/>
+          <pc:sldMk cId="1193214952" sldId="262"/>
+        </pc:sldMkLst>
+        <pc:spChg chg="mod">
+          <ac:chgData name="helio arai" userId="00509125f3a67541" providerId="LiveId" clId="{D9A7AF5A-9B85-424F-8A4D-C58E349D2138}" dt="2022-11-24T07:38:32.548" v="27" actId="20577"/>
+          <ac:spMkLst>
+            <pc:docMk/>
+            <pc:sldMk cId="1193214952" sldId="262"/>
+            <ac:spMk id="2" creationId="{07E35E33-BA55-42A4-B2B3-EFAEB140B6DE}"/>
+          </ac:spMkLst>
+        </pc:spChg>
+      </pc:sldChg>
+      <pc:sldChg chg="modSp mod">
+        <pc:chgData name="helio arai" userId="00509125f3a67541" providerId="LiveId" clId="{D9A7AF5A-9B85-424F-8A4D-C58E349D2138}" dt="2022-11-28T23:18:12.999" v="119" actId="20577"/>
+        <pc:sldMkLst>
+          <pc:docMk/>
+          <pc:sldMk cId="2318390660" sldId="263"/>
+        </pc:sldMkLst>
+        <pc:spChg chg="mod">
+          <ac:chgData name="helio arai" userId="00509125f3a67541" providerId="LiveId" clId="{D9A7AF5A-9B85-424F-8A4D-C58E349D2138}" dt="2022-11-28T23:18:12.999" v="119" actId="20577"/>
+          <ac:spMkLst>
+            <pc:docMk/>
+            <pc:sldMk cId="2318390660" sldId="263"/>
+            <ac:spMk id="15" creationId="{CC6A0FD7-08B5-279B-148A-0D1D53C4D7D7}"/>
+          </ac:spMkLst>
+        </pc:spChg>
+      </pc:sldChg>
+    </pc:docChg>
+  </pc:docChgLst>
+</pc:chgInfo>
+</file>
+
 <file path=ppt/slideLayouts/slideLayout1.xml><?xml version="1.0" encoding="utf-8"?>
 <p:sldLayout xmlns:a="http://schemas.openxmlformats.org/drawingml/2006/main" xmlns:r="http://schemas.openxmlformats.org/officeDocument/2006/relationships" xmlns:p="http://schemas.openxmlformats.org/presentationml/2006/main" type="title" preserve="1">
   <p:cSld name="Slide de Título">
@@ -266,7 +340,7 @@
           <a:p>
             <a:fld id="{33C0567F-6E76-44F9-9FDF-0660FC93FEED}" type="datetimeFigureOut">
               <a:rPr lang="pt-BR" smtClean="0"/>
-              <a:t>15/11/2022</a:t>
+              <a:t>28/11/2022</a:t>
             </a:fld>
             <a:endParaRPr lang="pt-BR"/>
           </a:p>
@@ -464,7 +538,7 @@
           <a:p>
             <a:fld id="{33C0567F-6E76-44F9-9FDF-0660FC93FEED}" type="datetimeFigureOut">
               <a:rPr lang="pt-BR" smtClean="0"/>
-              <a:t>15/11/2022</a:t>
+              <a:t>28/11/2022</a:t>
             </a:fld>
             <a:endParaRPr lang="pt-BR"/>
           </a:p>
@@ -672,7 +746,7 @@
           <a:p>
             <a:fld id="{33C0567F-6E76-44F9-9FDF-0660FC93FEED}" type="datetimeFigureOut">
               <a:rPr lang="pt-BR" smtClean="0"/>
-              <a:t>15/11/2022</a:t>
+              <a:t>28/11/2022</a:t>
             </a:fld>
             <a:endParaRPr lang="pt-BR"/>
           </a:p>
@@ -870,7 +944,7 @@
           <a:p>
             <a:fld id="{33C0567F-6E76-44F9-9FDF-0660FC93FEED}" type="datetimeFigureOut">
               <a:rPr lang="pt-BR" smtClean="0"/>
-              <a:t>15/11/2022</a:t>
+              <a:t>28/11/2022</a:t>
             </a:fld>
             <a:endParaRPr lang="pt-BR"/>
           </a:p>
@@ -1145,7 +1219,7 @@
           <a:p>
             <a:fld id="{33C0567F-6E76-44F9-9FDF-0660FC93FEED}" type="datetimeFigureOut">
               <a:rPr lang="pt-BR" smtClean="0"/>
-              <a:t>15/11/2022</a:t>
+              <a:t>28/11/2022</a:t>
             </a:fld>
             <a:endParaRPr lang="pt-BR"/>
           </a:p>
@@ -1410,7 +1484,7 @@
           <a:p>
             <a:fld id="{33C0567F-6E76-44F9-9FDF-0660FC93FEED}" type="datetimeFigureOut">
               <a:rPr lang="pt-BR" smtClean="0"/>
-              <a:t>15/11/2022</a:t>
+              <a:t>28/11/2022</a:t>
             </a:fld>
             <a:endParaRPr lang="pt-BR"/>
           </a:p>
@@ -1822,7 +1896,7 @@
           <a:p>
             <a:fld id="{33C0567F-6E76-44F9-9FDF-0660FC93FEED}" type="datetimeFigureOut">
               <a:rPr lang="pt-BR" smtClean="0"/>
-              <a:t>15/11/2022</a:t>
+              <a:t>28/11/2022</a:t>
             </a:fld>
             <a:endParaRPr lang="pt-BR"/>
           </a:p>
@@ -1963,7 +2037,7 @@
           <a:p>
             <a:fld id="{33C0567F-6E76-44F9-9FDF-0660FC93FEED}" type="datetimeFigureOut">
               <a:rPr lang="pt-BR" smtClean="0"/>
-              <a:t>15/11/2022</a:t>
+              <a:t>28/11/2022</a:t>
             </a:fld>
             <a:endParaRPr lang="pt-BR"/>
           </a:p>
@@ -2076,7 +2150,7 @@
           <a:p>
             <a:fld id="{33C0567F-6E76-44F9-9FDF-0660FC93FEED}" type="datetimeFigureOut">
               <a:rPr lang="pt-BR" smtClean="0"/>
-              <a:t>15/11/2022</a:t>
+              <a:t>28/11/2022</a:t>
             </a:fld>
             <a:endParaRPr lang="pt-BR"/>
           </a:p>
@@ -2387,7 +2461,7 @@
           <a:p>
             <a:fld id="{33C0567F-6E76-44F9-9FDF-0660FC93FEED}" type="datetimeFigureOut">
               <a:rPr lang="pt-BR" smtClean="0"/>
-              <a:t>15/11/2022</a:t>
+              <a:t>28/11/2022</a:t>
             </a:fld>
             <a:endParaRPr lang="pt-BR"/>
           </a:p>
@@ -2675,7 +2749,7 @@
           <a:p>
             <a:fld id="{33C0567F-6E76-44F9-9FDF-0660FC93FEED}" type="datetimeFigureOut">
               <a:rPr lang="pt-BR" smtClean="0"/>
-              <a:t>15/11/2022</a:t>
+              <a:t>28/11/2022</a:t>
             </a:fld>
             <a:endParaRPr lang="pt-BR"/>
           </a:p>
@@ -2916,7 +2990,7 @@
           <a:p>
             <a:fld id="{33C0567F-6E76-44F9-9FDF-0660FC93FEED}" type="datetimeFigureOut">
               <a:rPr lang="pt-BR" smtClean="0"/>
-              <a:t>15/11/2022</a:t>
+              <a:t>28/11/2022</a:t>
             </a:fld>
             <a:endParaRPr lang="pt-BR"/>
           </a:p>
@@ -5240,7 +5314,7 @@
               <a:rPr lang="pt-BR" sz="2400" dirty="0" err="1">
                 <a:latin typeface="Agency FB" panose="020B0503020202020204" pitchFamily="34" charset="0"/>
               </a:rPr>
-              <a:t>ClientAttendance</a:t>
+              <a:t>ManageAttendance</a:t>
             </a:r>
             <a:r>
               <a:rPr lang="pt-BR" sz="2400" dirty="0">
@@ -6492,8 +6566,29 @@
               <a:rPr lang="pt-BR" sz="2000" dirty="0">
                 <a:latin typeface="Agency FB" panose="020B0503020202020204" pitchFamily="34" charset="0"/>
               </a:rPr>
-              <a:t>Validação : Idade do cliente deve ser número inteiro acima de 15 anos. No nosso caso também restringimos a idade máxima em 110 anos </a:t>
-            </a:r>
+              <a:t>Validação : Idade do cliente deve ser número inteiro acima de 15 anos. No nosso caso também restringimos a idade máxima em 110 anos . Caso seja digitado </a:t>
+            </a:r>
+            <a:r>
+              <a:rPr lang="pt-BR" sz="2000" dirty="0" err="1">
+                <a:latin typeface="Agency FB" panose="020B0503020202020204" pitchFamily="34" charset="0"/>
+              </a:rPr>
+              <a:t>caracter</a:t>
+            </a:r>
+            <a:r>
+              <a:rPr lang="pt-BR" sz="2000" dirty="0">
+                <a:latin typeface="Agency FB" panose="020B0503020202020204" pitchFamily="34" charset="0"/>
+              </a:rPr>
+              <a:t> ou numero não inteiro, o mesmo não </a:t>
+            </a:r>
+            <a:r>
+              <a:rPr lang="pt-BR" sz="2000">
+                <a:latin typeface="Agency FB" panose="020B0503020202020204" pitchFamily="34" charset="0"/>
+              </a:rPr>
+              <a:t>será validado</a:t>
+            </a:r>
+            <a:endParaRPr lang="pt-BR" sz="2000" dirty="0">
+              <a:latin typeface="Agency FB" panose="020B0503020202020204" pitchFamily="34" charset="0"/>
+            </a:endParaRPr>
           </a:p>
           <a:p>
             <a:r>
@@ -6733,7 +6828,7 @@
               <a:rPr lang="pt-BR" sz="3600" dirty="0" err="1">
                 <a:latin typeface="Agency FB" panose="020B0503020202020204" pitchFamily="34" charset="0"/>
               </a:rPr>
-              <a:t>ClientAttendance</a:t>
+              <a:t>ManageAttendance</a:t>
             </a:r>
             <a:r>
               <a:rPr lang="pt-BR" sz="3600" dirty="0">
@@ -7802,19 +7897,19 @@
               <a:rPr lang="pt-BR" sz="2400" dirty="0">
                 <a:latin typeface="Agency FB" panose="020B0503020202020204" pitchFamily="34" charset="0"/>
               </a:rPr>
-              <a:t>    -  </a:t>
-            </a:r>
-            <a:r>
-              <a:rPr lang="pt-BR" sz="2400" dirty="0" err="1">
-                <a:latin typeface="Agency FB" panose="020B0503020202020204" pitchFamily="34" charset="0"/>
-              </a:rPr>
-              <a:t>Nao</a:t>
+              <a:t>    </a:t>
+            </a:r>
+            <a:r>
+              <a:rPr lang="pt-BR" sz="2400">
+                <a:latin typeface="Agency FB" panose="020B0503020202020204" pitchFamily="34" charset="0"/>
+              </a:rPr>
+              <a:t>-  Não </a:t>
             </a:r>
             <a:r>
               <a:rPr lang="pt-BR" sz="2400" dirty="0">
                 <a:latin typeface="Agency FB" panose="020B0503020202020204" pitchFamily="34" charset="0"/>
               </a:rPr>
-              <a:t> podemos encerrar, clientes aguardando na fila</a:t>
+              <a:t>podemos encerrar, clientes aguardando na fila</a:t>
             </a:r>
           </a:p>
           <a:p>

</xml_diff>